<commit_message>
updated and restructured mvs and reqs.md
</commit_message>
<xml_diff>
--- a/project_journal/standup/presentations/sprint4_standup.pptx
+++ b/project_journal/standup/presentations/sprint4_standup.pptx
@@ -16,6 +16,12 @@
     <p:sldId id="260" r:id="rId10"/>
     <p:sldId id="259" r:id="rId11"/>
     <p:sldId id="267" r:id="rId12"/>
+    <p:sldId id="268" r:id="rId13"/>
+    <p:sldId id="269" r:id="rId14"/>
+    <p:sldId id="270" r:id="rId15"/>
+    <p:sldId id="271" r:id="rId16"/>
+    <p:sldId id="272" r:id="rId17"/>
+    <p:sldId id="273" r:id="rId18"/>
   </p:sldIdLst>
   <p:sldSz cx="12192000" cy="6858000"/>
   <p:notesSz cx="6858000" cy="9144000"/>
@@ -1661,7 +1667,7 @@
           <a:p>
             <a:fld id="{C5760A9E-F5D7-4040-B515-3D966B4E754C}" type="datetimeFigureOut">
               <a:rPr lang="en-US" smtClean="0"/>
-              <a:t>6/11/2025</a:t>
+              <a:t>6/12/2025</a:t>
             </a:fld>
             <a:endParaRPr lang="en-US"/>
           </a:p>
@@ -1859,7 +1865,7 @@
           <a:p>
             <a:fld id="{C5760A9E-F5D7-4040-B515-3D966B4E754C}" type="datetimeFigureOut">
               <a:rPr lang="en-US" smtClean="0"/>
-              <a:t>6/11/2025</a:t>
+              <a:t>6/12/2025</a:t>
             </a:fld>
             <a:endParaRPr lang="en-US"/>
           </a:p>
@@ -2067,7 +2073,7 @@
           <a:p>
             <a:fld id="{C5760A9E-F5D7-4040-B515-3D966B4E754C}" type="datetimeFigureOut">
               <a:rPr lang="en-US" smtClean="0"/>
-              <a:t>6/11/2025</a:t>
+              <a:t>6/12/2025</a:t>
             </a:fld>
             <a:endParaRPr lang="en-US"/>
           </a:p>
@@ -2265,7 +2271,7 @@
           <a:p>
             <a:fld id="{C5760A9E-F5D7-4040-B515-3D966B4E754C}" type="datetimeFigureOut">
               <a:rPr lang="en-US" smtClean="0"/>
-              <a:t>6/11/2025</a:t>
+              <a:t>6/12/2025</a:t>
             </a:fld>
             <a:endParaRPr lang="en-US"/>
           </a:p>
@@ -2540,7 +2546,7 @@
           <a:p>
             <a:fld id="{C5760A9E-F5D7-4040-B515-3D966B4E754C}" type="datetimeFigureOut">
               <a:rPr lang="en-US" smtClean="0"/>
-              <a:t>6/11/2025</a:t>
+              <a:t>6/12/2025</a:t>
             </a:fld>
             <a:endParaRPr lang="en-US"/>
           </a:p>
@@ -2805,7 +2811,7 @@
           <a:p>
             <a:fld id="{C5760A9E-F5D7-4040-B515-3D966B4E754C}" type="datetimeFigureOut">
               <a:rPr lang="en-US" smtClean="0"/>
-              <a:t>6/11/2025</a:t>
+              <a:t>6/12/2025</a:t>
             </a:fld>
             <a:endParaRPr lang="en-US"/>
           </a:p>
@@ -3217,7 +3223,7 @@
           <a:p>
             <a:fld id="{C5760A9E-F5D7-4040-B515-3D966B4E754C}" type="datetimeFigureOut">
               <a:rPr lang="en-US" smtClean="0"/>
-              <a:t>6/11/2025</a:t>
+              <a:t>6/12/2025</a:t>
             </a:fld>
             <a:endParaRPr lang="en-US"/>
           </a:p>
@@ -3358,7 +3364,7 @@
           <a:p>
             <a:fld id="{C5760A9E-F5D7-4040-B515-3D966B4E754C}" type="datetimeFigureOut">
               <a:rPr lang="en-US" smtClean="0"/>
-              <a:t>6/11/2025</a:t>
+              <a:t>6/12/2025</a:t>
             </a:fld>
             <a:endParaRPr lang="en-US"/>
           </a:p>
@@ -3471,7 +3477,7 @@
           <a:p>
             <a:fld id="{C5760A9E-F5D7-4040-B515-3D966B4E754C}" type="datetimeFigureOut">
               <a:rPr lang="en-US" smtClean="0"/>
-              <a:t>6/11/2025</a:t>
+              <a:t>6/12/2025</a:t>
             </a:fld>
             <a:endParaRPr lang="en-US"/>
           </a:p>
@@ -3782,7 +3788,7 @@
           <a:p>
             <a:fld id="{C5760A9E-F5D7-4040-B515-3D966B4E754C}" type="datetimeFigureOut">
               <a:rPr lang="en-US" smtClean="0"/>
-              <a:t>6/11/2025</a:t>
+              <a:t>6/12/2025</a:t>
             </a:fld>
             <a:endParaRPr lang="en-US"/>
           </a:p>
@@ -4070,7 +4076,7 @@
           <a:p>
             <a:fld id="{C5760A9E-F5D7-4040-B515-3D966B4E754C}" type="datetimeFigureOut">
               <a:rPr lang="en-US" smtClean="0"/>
-              <a:t>6/11/2025</a:t>
+              <a:t>6/12/2025</a:t>
             </a:fld>
             <a:endParaRPr lang="en-US"/>
           </a:p>
@@ -4311,7 +4317,7 @@
           <a:p>
             <a:fld id="{C5760A9E-F5D7-4040-B515-3D966B4E754C}" type="datetimeFigureOut">
               <a:rPr lang="en-US" smtClean="0"/>
-              <a:t>6/11/2025</a:t>
+              <a:t>6/12/2025</a:t>
             </a:fld>
             <a:endParaRPr lang="en-US"/>
           </a:p>
@@ -4922,36 +4928,244 @@
             <p:ph type="title"/>
           </p:nvPr>
         </p:nvSpPr>
-        <p:spPr/>
-        <p:txBody>
-          <a:bodyPr/>
-          <a:lstStyle/>
-          <a:p>
-            <a:endParaRPr lang="en-US"/>
-          </a:p>
-        </p:txBody>
-      </p:sp>
-      <p:sp>
-        <p:nvSpPr>
-          <p:cNvPr id="3" name="Content Placeholder 2">
-            <a:extLst>
-              <a:ext uri="{FF2B5EF4-FFF2-40B4-BE49-F238E27FC236}">
-                <a16:creationId xmlns:a16="http://schemas.microsoft.com/office/drawing/2014/main" id="{BCB53EC7-2B78-FDEA-F0BF-1240B2AE6758}"/>
-              </a:ext>
-            </a:extLst>
-          </p:cNvPr>
-          <p:cNvSpPr>
-            <a:spLocks noGrp="1"/>
-          </p:cNvSpPr>
-          <p:nvPr>
-            <p:ph idx="1"/>
-          </p:nvPr>
-        </p:nvSpPr>
-        <p:spPr/>
-        <p:txBody>
-          <a:bodyPr/>
-          <a:lstStyle/>
-          <a:p>
+        <p:spPr>
+          <a:xfrm>
+            <a:off x="248264" y="99654"/>
+            <a:ext cx="8050162" cy="618101"/>
+          </a:xfrm>
+        </p:spPr>
+        <p:txBody>
+          <a:bodyPr>
+            <a:normAutofit fontScale="90000"/>
+          </a:bodyPr>
+          <a:lstStyle/>
+          <a:p>
+            <a:r>
+              <a:rPr lang="en-US" dirty="0"/>
+              <a:t>Master Schedule (Day #2 -  6/12)</a:t>
+            </a:r>
+          </a:p>
+        </p:txBody>
+      </p:sp>
+      <p:pic>
+        <p:nvPicPr>
+          <p:cNvPr id="5" name="Picture 4" descr="A graph with colorful lines">
+            <a:extLst>
+              <a:ext uri="{FF2B5EF4-FFF2-40B4-BE49-F238E27FC236}">
+                <a16:creationId xmlns:a16="http://schemas.microsoft.com/office/drawing/2014/main" id="{BFE2EF59-25C2-7DDF-F864-96B9B9271A25}"/>
+              </a:ext>
+            </a:extLst>
+          </p:cNvPr>
+          <p:cNvPicPr>
+            <a:picLocks noChangeAspect="1"/>
+          </p:cNvPicPr>
+          <p:nvPr/>
+        </p:nvPicPr>
+        <p:blipFill>
+          <a:blip r:embed="rId2">
+            <a:extLst>
+              <a:ext uri="{28A0092B-C50C-407E-A947-70E740481C1C}">
+                <a14:useLocalDpi xmlns:a14="http://schemas.microsoft.com/office/drawing/2010/main" val="0"/>
+              </a:ext>
+            </a:extLst>
+          </a:blip>
+          <a:stretch>
+            <a:fillRect/>
+          </a:stretch>
+        </p:blipFill>
+        <p:spPr>
+          <a:xfrm>
+            <a:off x="87130" y="717754"/>
+            <a:ext cx="11897826" cy="5860027"/>
+          </a:xfrm>
+          <a:prstGeom prst="rect">
+            <a:avLst/>
+          </a:prstGeom>
+        </p:spPr>
+      </p:pic>
+      <p:sp>
+        <p:nvSpPr>
+          <p:cNvPr id="6" name="TextBox 5">
+            <a:extLst>
+              <a:ext uri="{FF2B5EF4-FFF2-40B4-BE49-F238E27FC236}">
+                <a16:creationId xmlns:a16="http://schemas.microsoft.com/office/drawing/2014/main" id="{F03FA2C4-0327-28B4-D039-A2DDE4179797}"/>
+              </a:ext>
+            </a:extLst>
+          </p:cNvPr>
+          <p:cNvSpPr txBox="1"/>
+          <p:nvPr/>
+        </p:nvSpPr>
+        <p:spPr>
+          <a:xfrm>
+            <a:off x="7364361" y="1769806"/>
+            <a:ext cx="1278194" cy="4591665"/>
+          </a:xfrm>
+          <a:prstGeom prst="rect">
+            <a:avLst/>
+          </a:prstGeom>
+          <a:solidFill>
+            <a:schemeClr val="accent2">
+              <a:alpha val="50000"/>
+            </a:schemeClr>
+          </a:solidFill>
+          <a:ln>
+            <a:noFill/>
+          </a:ln>
+        </p:spPr>
+        <p:style>
+          <a:lnRef idx="0">
+            <a:scrgbClr r="0" g="0" b="0"/>
+          </a:lnRef>
+          <a:fillRef idx="0">
+            <a:scrgbClr r="0" g="0" b="0"/>
+          </a:fillRef>
+          <a:effectRef idx="0">
+            <a:scrgbClr r="0" g="0" b="0"/>
+          </a:effectRef>
+          <a:fontRef idx="minor">
+            <a:schemeClr val="lt1"/>
+          </a:fontRef>
+        </p:style>
+        <p:txBody>
+          <a:bodyPr wrap="square" rtlCol="0">
+            <a:spAutoFit/>
+          </a:bodyPr>
+          <a:lstStyle/>
+          <a:p>
+            <a:endParaRPr lang="en-US" dirty="0"/>
+          </a:p>
+        </p:txBody>
+      </p:sp>
+      <p:sp>
+        <p:nvSpPr>
+          <p:cNvPr id="7" name="TextBox 6">
+            <a:extLst>
+              <a:ext uri="{FF2B5EF4-FFF2-40B4-BE49-F238E27FC236}">
+                <a16:creationId xmlns:a16="http://schemas.microsoft.com/office/drawing/2014/main" id="{BCBC775E-CB44-FC85-227B-6BC6C87020E0}"/>
+              </a:ext>
+            </a:extLst>
+          </p:cNvPr>
+          <p:cNvSpPr txBox="1"/>
+          <p:nvPr/>
+        </p:nvSpPr>
+        <p:spPr>
+          <a:xfrm>
+            <a:off x="7639664" y="1769805"/>
+            <a:ext cx="1002891" cy="369332"/>
+          </a:xfrm>
+          <a:prstGeom prst="rect">
+            <a:avLst/>
+          </a:prstGeom>
+          <a:noFill/>
+        </p:spPr>
+        <p:txBody>
+          <a:bodyPr wrap="square" rtlCol="0">
+            <a:spAutoFit/>
+          </a:bodyPr>
+          <a:lstStyle/>
+          <a:p>
+            <a:r>
+              <a:rPr lang="en-US" dirty="0">
+                <a:solidFill>
+                  <a:schemeClr val="bg1">
+                    <a:lumMod val="95000"/>
+                  </a:schemeClr>
+                </a:solidFill>
+              </a:rPr>
+              <a:t>Sprint 4</a:t>
+            </a:r>
+          </a:p>
+        </p:txBody>
+      </p:sp>
+      <p:sp>
+        <p:nvSpPr>
+          <p:cNvPr id="8" name="TextBox 7">
+            <a:extLst>
+              <a:ext uri="{FF2B5EF4-FFF2-40B4-BE49-F238E27FC236}">
+                <a16:creationId xmlns:a16="http://schemas.microsoft.com/office/drawing/2014/main" id="{2BAF9385-FA2D-3C56-C987-276948017680}"/>
+              </a:ext>
+            </a:extLst>
+          </p:cNvPr>
+          <p:cNvSpPr txBox="1"/>
+          <p:nvPr/>
+        </p:nvSpPr>
+        <p:spPr>
+          <a:xfrm>
+            <a:off x="7162799" y="2335160"/>
+            <a:ext cx="703007" cy="523220"/>
+          </a:xfrm>
+          <a:prstGeom prst="rect">
+            <a:avLst/>
+          </a:prstGeom>
+          <a:noFill/>
+        </p:spPr>
+        <p:txBody>
+          <a:bodyPr wrap="square" rtlCol="0">
+            <a:spAutoFit/>
+          </a:bodyPr>
+          <a:lstStyle/>
+          <a:p>
+            <a:r>
+              <a:rPr lang="en-US" sz="1400" dirty="0">
+                <a:solidFill>
+                  <a:schemeClr val="bg1">
+                    <a:lumMod val="95000"/>
+                  </a:schemeClr>
+                </a:solidFill>
+              </a:rPr>
+              <a:t>Today 6/12</a:t>
+            </a:r>
+          </a:p>
+        </p:txBody>
+      </p:sp>
+      <p:sp>
+        <p:nvSpPr>
+          <p:cNvPr id="9" name="Isosceles Triangle 8">
+            <a:extLst>
+              <a:ext uri="{FF2B5EF4-FFF2-40B4-BE49-F238E27FC236}">
+                <a16:creationId xmlns:a16="http://schemas.microsoft.com/office/drawing/2014/main" id="{75E69B20-3D23-0104-E147-324E5872228D}"/>
+              </a:ext>
+            </a:extLst>
+          </p:cNvPr>
+          <p:cNvSpPr/>
+          <p:nvPr/>
+        </p:nvSpPr>
+        <p:spPr>
+          <a:xfrm rot="10800000">
+            <a:off x="7288160" y="2848663"/>
+            <a:ext cx="246669" cy="235744"/>
+          </a:xfrm>
+          <a:prstGeom prst="triangle">
+            <a:avLst/>
+          </a:prstGeom>
+          <a:solidFill>
+            <a:schemeClr val="bg1"/>
+          </a:solidFill>
+          <a:ln>
+            <a:noFill/>
+          </a:ln>
+        </p:spPr>
+        <p:style>
+          <a:lnRef idx="2">
+            <a:schemeClr val="accent1">
+              <a:shade val="15000"/>
+            </a:schemeClr>
+          </a:lnRef>
+          <a:fillRef idx="1">
+            <a:schemeClr val="accent1"/>
+          </a:fillRef>
+          <a:effectRef idx="0">
+            <a:schemeClr val="accent1"/>
+          </a:effectRef>
+          <a:fontRef idx="minor">
+            <a:schemeClr val="lt1"/>
+          </a:fontRef>
+        </p:style>
+        <p:txBody>
+          <a:bodyPr rtlCol="0" anchor="ctr"/>
+          <a:lstStyle/>
+          <a:p>
+            <a:pPr algn="ctr"/>
             <a:endParaRPr lang="en-US"/>
           </a:p>
         </p:txBody>
@@ -4960,6 +5174,613 @@
     <p:extLst>
       <p:ext uri="{BB962C8B-B14F-4D97-AF65-F5344CB8AC3E}">
         <p14:creationId xmlns:p14="http://schemas.microsoft.com/office/powerpoint/2010/main" val="2483103540"/>
+      </p:ext>
+    </p:extLst>
+  </p:cSld>
+  <p:clrMapOvr>
+    <a:masterClrMapping/>
+  </p:clrMapOvr>
+</p:sld>
+</file>
+
+<file path=ppt/slides/slide12.xml><?xml version="1.0" encoding="utf-8"?>
+<p:sld xmlns:a="http://schemas.openxmlformats.org/drawingml/2006/main" xmlns:r="http://schemas.openxmlformats.org/officeDocument/2006/relationships" xmlns:p="http://schemas.openxmlformats.org/presentationml/2006/main">
+  <p:cSld>
+    <p:spTree>
+      <p:nvGrpSpPr>
+        <p:cNvPr id="1" name=""/>
+        <p:cNvGrpSpPr/>
+        <p:nvPr/>
+      </p:nvGrpSpPr>
+      <p:grpSpPr>
+        <a:xfrm>
+          <a:off x="0" y="0"/>
+          <a:ext cx="0" cy="0"/>
+          <a:chOff x="0" y="0"/>
+          <a:chExt cx="0" cy="0"/>
+        </a:xfrm>
+      </p:grpSpPr>
+      <p:sp>
+        <p:nvSpPr>
+          <p:cNvPr id="2" name="Title 1">
+            <a:extLst>
+              <a:ext uri="{FF2B5EF4-FFF2-40B4-BE49-F238E27FC236}">
+                <a16:creationId xmlns:a16="http://schemas.microsoft.com/office/drawing/2014/main" id="{EE035C0D-C94A-81DF-9C57-9C2DAFE4419B}"/>
+              </a:ext>
+            </a:extLst>
+          </p:cNvPr>
+          <p:cNvSpPr>
+            <a:spLocks noGrp="1"/>
+          </p:cNvSpPr>
+          <p:nvPr>
+            <p:ph type="title"/>
+          </p:nvPr>
+        </p:nvSpPr>
+        <p:spPr>
+          <a:xfrm>
+            <a:off x="685331" y="0"/>
+            <a:ext cx="4313903" cy="834410"/>
+          </a:xfrm>
+        </p:spPr>
+        <p:txBody>
+          <a:bodyPr/>
+          <a:lstStyle/>
+          <a:p>
+            <a:r>
+              <a:rPr lang="en-US" dirty="0"/>
+              <a:t>Sprint 4 Schedule</a:t>
+            </a:r>
+          </a:p>
+        </p:txBody>
+      </p:sp>
+      <p:pic>
+        <p:nvPicPr>
+          <p:cNvPr id="5" name="Picture 4" descr="A screenshot of a computer screen">
+            <a:extLst>
+              <a:ext uri="{FF2B5EF4-FFF2-40B4-BE49-F238E27FC236}">
+                <a16:creationId xmlns:a16="http://schemas.microsoft.com/office/drawing/2014/main" id="{CDCDFB86-FEFF-4C41-9354-B8CA38384497}"/>
+              </a:ext>
+            </a:extLst>
+          </p:cNvPr>
+          <p:cNvPicPr>
+            <a:picLocks noChangeAspect="1"/>
+          </p:cNvPicPr>
+          <p:nvPr/>
+        </p:nvPicPr>
+        <p:blipFill>
+          <a:blip r:embed="rId2">
+            <a:extLst>
+              <a:ext uri="{28A0092B-C50C-407E-A947-70E740481C1C}">
+                <a14:useLocalDpi xmlns:a14="http://schemas.microsoft.com/office/drawing/2010/main" val="0"/>
+              </a:ext>
+            </a:extLst>
+          </a:blip>
+          <a:stretch>
+            <a:fillRect/>
+          </a:stretch>
+        </p:blipFill>
+        <p:spPr>
+          <a:xfrm>
+            <a:off x="124893" y="716424"/>
+            <a:ext cx="11850798" cy="5992164"/>
+          </a:xfrm>
+          <a:prstGeom prst="rect">
+            <a:avLst/>
+          </a:prstGeom>
+        </p:spPr>
+      </p:pic>
+      <p:sp>
+        <p:nvSpPr>
+          <p:cNvPr id="6" name="TextBox 5">
+            <a:extLst>
+              <a:ext uri="{FF2B5EF4-FFF2-40B4-BE49-F238E27FC236}">
+                <a16:creationId xmlns:a16="http://schemas.microsoft.com/office/drawing/2014/main" id="{3FA7F09D-08CA-1CFB-26A6-E72F887DE7D0}"/>
+              </a:ext>
+            </a:extLst>
+          </p:cNvPr>
+          <p:cNvSpPr txBox="1"/>
+          <p:nvPr/>
+        </p:nvSpPr>
+        <p:spPr>
+          <a:xfrm>
+            <a:off x="2325328" y="644012"/>
+            <a:ext cx="703007" cy="523220"/>
+          </a:xfrm>
+          <a:prstGeom prst="rect">
+            <a:avLst/>
+          </a:prstGeom>
+          <a:noFill/>
+        </p:spPr>
+        <p:txBody>
+          <a:bodyPr wrap="square" rtlCol="0">
+            <a:spAutoFit/>
+          </a:bodyPr>
+          <a:lstStyle/>
+          <a:p>
+            <a:r>
+              <a:rPr lang="en-US" sz="1400" dirty="0">
+                <a:solidFill>
+                  <a:schemeClr val="bg1">
+                    <a:lumMod val="95000"/>
+                  </a:schemeClr>
+                </a:solidFill>
+              </a:rPr>
+              <a:t>Today 6/12</a:t>
+            </a:r>
+          </a:p>
+        </p:txBody>
+      </p:sp>
+      <p:sp>
+        <p:nvSpPr>
+          <p:cNvPr id="7" name="Isosceles Triangle 6">
+            <a:extLst>
+              <a:ext uri="{FF2B5EF4-FFF2-40B4-BE49-F238E27FC236}">
+                <a16:creationId xmlns:a16="http://schemas.microsoft.com/office/drawing/2014/main" id="{DD99120C-99B0-BE20-4821-4A17B5EB856B}"/>
+              </a:ext>
+            </a:extLst>
+          </p:cNvPr>
+          <p:cNvSpPr/>
+          <p:nvPr/>
+        </p:nvSpPr>
+        <p:spPr>
+          <a:xfrm rot="10800000">
+            <a:off x="2450689" y="1157515"/>
+            <a:ext cx="246669" cy="235744"/>
+          </a:xfrm>
+          <a:prstGeom prst="triangle">
+            <a:avLst/>
+          </a:prstGeom>
+          <a:solidFill>
+            <a:schemeClr val="bg1"/>
+          </a:solidFill>
+          <a:ln>
+            <a:noFill/>
+          </a:ln>
+        </p:spPr>
+        <p:style>
+          <a:lnRef idx="2">
+            <a:schemeClr val="accent1">
+              <a:shade val="15000"/>
+            </a:schemeClr>
+          </a:lnRef>
+          <a:fillRef idx="1">
+            <a:schemeClr val="accent1"/>
+          </a:fillRef>
+          <a:effectRef idx="0">
+            <a:schemeClr val="accent1"/>
+          </a:effectRef>
+          <a:fontRef idx="minor">
+            <a:schemeClr val="lt1"/>
+          </a:fontRef>
+        </p:style>
+        <p:txBody>
+          <a:bodyPr rtlCol="0" anchor="ctr"/>
+          <a:lstStyle/>
+          <a:p>
+            <a:pPr algn="ctr"/>
+            <a:endParaRPr lang="en-US"/>
+          </a:p>
+        </p:txBody>
+      </p:sp>
+    </p:spTree>
+    <p:extLst>
+      <p:ext uri="{BB962C8B-B14F-4D97-AF65-F5344CB8AC3E}">
+        <p14:creationId xmlns:p14="http://schemas.microsoft.com/office/powerpoint/2010/main" val="557855740"/>
+      </p:ext>
+    </p:extLst>
+  </p:cSld>
+  <p:clrMapOvr>
+    <a:masterClrMapping/>
+  </p:clrMapOvr>
+</p:sld>
+</file>
+
+<file path=ppt/slides/slide13.xml><?xml version="1.0" encoding="utf-8"?>
+<p:sld xmlns:a="http://schemas.openxmlformats.org/drawingml/2006/main" xmlns:r="http://schemas.openxmlformats.org/officeDocument/2006/relationships" xmlns:p="http://schemas.openxmlformats.org/presentationml/2006/main">
+  <p:cSld>
+    <p:spTree>
+      <p:nvGrpSpPr>
+        <p:cNvPr id="1" name=""/>
+        <p:cNvGrpSpPr/>
+        <p:nvPr/>
+      </p:nvGrpSpPr>
+      <p:grpSpPr>
+        <a:xfrm>
+          <a:off x="0" y="0"/>
+          <a:ext cx="0" cy="0"/>
+          <a:chOff x="0" y="0"/>
+          <a:chExt cx="0" cy="0"/>
+        </a:xfrm>
+      </p:grpSpPr>
+      <p:sp>
+        <p:nvSpPr>
+          <p:cNvPr id="2" name="Title 1">
+            <a:extLst>
+              <a:ext uri="{FF2B5EF4-FFF2-40B4-BE49-F238E27FC236}">
+                <a16:creationId xmlns:a16="http://schemas.microsoft.com/office/drawing/2014/main" id="{9A5C179E-E290-EA14-9048-2DFBBC2D8E81}"/>
+              </a:ext>
+            </a:extLst>
+          </p:cNvPr>
+          <p:cNvSpPr>
+            <a:spLocks noGrp="1"/>
+          </p:cNvSpPr>
+          <p:nvPr>
+            <p:ph type="title"/>
+          </p:nvPr>
+        </p:nvSpPr>
+        <p:spPr/>
+        <p:txBody>
+          <a:bodyPr/>
+          <a:lstStyle/>
+          <a:p>
+            <a:r>
+              <a:rPr lang="en-US" dirty="0"/>
+              <a:t>Agenda (Day #2 -  6/12)</a:t>
+            </a:r>
+          </a:p>
+        </p:txBody>
+      </p:sp>
+      <p:sp>
+        <p:nvSpPr>
+          <p:cNvPr id="3" name="Content Placeholder 2">
+            <a:extLst>
+              <a:ext uri="{FF2B5EF4-FFF2-40B4-BE49-F238E27FC236}">
+                <a16:creationId xmlns:a16="http://schemas.microsoft.com/office/drawing/2014/main" id="{69E44E7B-218F-A63B-B29A-9876D8F2A3C1}"/>
+              </a:ext>
+            </a:extLst>
+          </p:cNvPr>
+          <p:cNvSpPr>
+            <a:spLocks noGrp="1"/>
+          </p:cNvSpPr>
+          <p:nvPr>
+            <p:ph idx="1"/>
+          </p:nvPr>
+        </p:nvSpPr>
+        <p:spPr/>
+        <p:txBody>
+          <a:bodyPr/>
+          <a:lstStyle/>
+          <a:p>
+            <a:endParaRPr lang="en-US"/>
+          </a:p>
+        </p:txBody>
+      </p:sp>
+    </p:spTree>
+    <p:extLst>
+      <p:ext uri="{BB962C8B-B14F-4D97-AF65-F5344CB8AC3E}">
+        <p14:creationId xmlns:p14="http://schemas.microsoft.com/office/powerpoint/2010/main" val="4086750284"/>
+      </p:ext>
+    </p:extLst>
+  </p:cSld>
+  <p:clrMapOvr>
+    <a:masterClrMapping/>
+  </p:clrMapOvr>
+</p:sld>
+</file>
+
+<file path=ppt/slides/slide14.xml><?xml version="1.0" encoding="utf-8"?>
+<p:sld xmlns:a="http://schemas.openxmlformats.org/drawingml/2006/main" xmlns:r="http://schemas.openxmlformats.org/officeDocument/2006/relationships" xmlns:p="http://schemas.openxmlformats.org/presentationml/2006/main">
+  <p:cSld>
+    <p:spTree>
+      <p:nvGrpSpPr>
+        <p:cNvPr id="1" name=""/>
+        <p:cNvGrpSpPr/>
+        <p:nvPr/>
+      </p:nvGrpSpPr>
+      <p:grpSpPr>
+        <a:xfrm>
+          <a:off x="0" y="0"/>
+          <a:ext cx="0" cy="0"/>
+          <a:chOff x="0" y="0"/>
+          <a:chExt cx="0" cy="0"/>
+        </a:xfrm>
+      </p:grpSpPr>
+      <p:sp>
+        <p:nvSpPr>
+          <p:cNvPr id="2" name="Title 1">
+            <a:extLst>
+              <a:ext uri="{FF2B5EF4-FFF2-40B4-BE49-F238E27FC236}">
+                <a16:creationId xmlns:a16="http://schemas.microsoft.com/office/drawing/2014/main" id="{B7643A46-E5AB-6691-4182-E2EFB720D23F}"/>
+              </a:ext>
+            </a:extLst>
+          </p:cNvPr>
+          <p:cNvSpPr>
+            <a:spLocks noGrp="1"/>
+          </p:cNvSpPr>
+          <p:nvPr>
+            <p:ph type="title"/>
+          </p:nvPr>
+        </p:nvSpPr>
+        <p:spPr/>
+        <p:txBody>
+          <a:bodyPr/>
+          <a:lstStyle/>
+          <a:p>
+            <a:r>
+              <a:rPr lang="en-US" dirty="0"/>
+              <a:t>Previous Progress</a:t>
+            </a:r>
+          </a:p>
+        </p:txBody>
+      </p:sp>
+      <p:sp>
+        <p:nvSpPr>
+          <p:cNvPr id="3" name="Content Placeholder 2">
+            <a:extLst>
+              <a:ext uri="{FF2B5EF4-FFF2-40B4-BE49-F238E27FC236}">
+                <a16:creationId xmlns:a16="http://schemas.microsoft.com/office/drawing/2014/main" id="{C04F7F2F-7EC1-2FBA-30DE-80A94C11CD68}"/>
+              </a:ext>
+            </a:extLst>
+          </p:cNvPr>
+          <p:cNvSpPr>
+            <a:spLocks noGrp="1"/>
+          </p:cNvSpPr>
+          <p:nvPr>
+            <p:ph idx="1"/>
+          </p:nvPr>
+        </p:nvSpPr>
+        <p:spPr/>
+        <p:txBody>
+          <a:bodyPr/>
+          <a:lstStyle/>
+          <a:p>
+            <a:endParaRPr lang="en-US"/>
+          </a:p>
+        </p:txBody>
+      </p:sp>
+    </p:spTree>
+    <p:extLst>
+      <p:ext uri="{BB962C8B-B14F-4D97-AF65-F5344CB8AC3E}">
+        <p14:creationId xmlns:p14="http://schemas.microsoft.com/office/powerpoint/2010/main" val="2296373766"/>
+      </p:ext>
+    </p:extLst>
+  </p:cSld>
+  <p:clrMapOvr>
+    <a:masterClrMapping/>
+  </p:clrMapOvr>
+</p:sld>
+</file>
+
+<file path=ppt/slides/slide15.xml><?xml version="1.0" encoding="utf-8"?>
+<p:sld xmlns:a="http://schemas.openxmlformats.org/drawingml/2006/main" xmlns:r="http://schemas.openxmlformats.org/officeDocument/2006/relationships" xmlns:p="http://schemas.openxmlformats.org/presentationml/2006/main">
+  <p:cSld>
+    <p:spTree>
+      <p:nvGrpSpPr>
+        <p:cNvPr id="1" name=""/>
+        <p:cNvGrpSpPr/>
+        <p:nvPr/>
+      </p:nvGrpSpPr>
+      <p:grpSpPr>
+        <a:xfrm>
+          <a:off x="0" y="0"/>
+          <a:ext cx="0" cy="0"/>
+          <a:chOff x="0" y="0"/>
+          <a:chExt cx="0" cy="0"/>
+        </a:xfrm>
+      </p:grpSpPr>
+      <p:sp>
+        <p:nvSpPr>
+          <p:cNvPr id="2" name="Title 1">
+            <a:extLst>
+              <a:ext uri="{FF2B5EF4-FFF2-40B4-BE49-F238E27FC236}">
+                <a16:creationId xmlns:a16="http://schemas.microsoft.com/office/drawing/2014/main" id="{BE67977A-503F-7A00-DE1E-55B5F5F737EA}"/>
+              </a:ext>
+            </a:extLst>
+          </p:cNvPr>
+          <p:cNvSpPr>
+            <a:spLocks noGrp="1"/>
+          </p:cNvSpPr>
+          <p:nvPr>
+            <p:ph type="title"/>
+          </p:nvPr>
+        </p:nvSpPr>
+        <p:spPr/>
+        <p:txBody>
+          <a:bodyPr/>
+          <a:lstStyle/>
+          <a:p>
+            <a:r>
+              <a:rPr lang="en-US" dirty="0"/>
+              <a:t>Problems &amp; Blockers</a:t>
+            </a:r>
+          </a:p>
+        </p:txBody>
+      </p:sp>
+      <p:sp>
+        <p:nvSpPr>
+          <p:cNvPr id="3" name="Content Placeholder 2">
+            <a:extLst>
+              <a:ext uri="{FF2B5EF4-FFF2-40B4-BE49-F238E27FC236}">
+                <a16:creationId xmlns:a16="http://schemas.microsoft.com/office/drawing/2014/main" id="{6E0E7A23-B704-1BCA-568A-C7531BCCED74}"/>
+              </a:ext>
+            </a:extLst>
+          </p:cNvPr>
+          <p:cNvSpPr>
+            <a:spLocks noGrp="1"/>
+          </p:cNvSpPr>
+          <p:nvPr>
+            <p:ph idx="1"/>
+          </p:nvPr>
+        </p:nvSpPr>
+        <p:spPr/>
+        <p:txBody>
+          <a:bodyPr/>
+          <a:lstStyle/>
+          <a:p>
+            <a:endParaRPr lang="en-US"/>
+          </a:p>
+        </p:txBody>
+      </p:sp>
+    </p:spTree>
+    <p:extLst>
+      <p:ext uri="{BB962C8B-B14F-4D97-AF65-F5344CB8AC3E}">
+        <p14:creationId xmlns:p14="http://schemas.microsoft.com/office/powerpoint/2010/main" val="3579901472"/>
+      </p:ext>
+    </p:extLst>
+  </p:cSld>
+  <p:clrMapOvr>
+    <a:masterClrMapping/>
+  </p:clrMapOvr>
+</p:sld>
+</file>
+
+<file path=ppt/slides/slide16.xml><?xml version="1.0" encoding="utf-8"?>
+<p:sld xmlns:a="http://schemas.openxmlformats.org/drawingml/2006/main" xmlns:r="http://schemas.openxmlformats.org/officeDocument/2006/relationships" xmlns:p="http://schemas.openxmlformats.org/presentationml/2006/main">
+  <p:cSld>
+    <p:spTree>
+      <p:nvGrpSpPr>
+        <p:cNvPr id="1" name=""/>
+        <p:cNvGrpSpPr/>
+        <p:nvPr/>
+      </p:nvGrpSpPr>
+      <p:grpSpPr>
+        <a:xfrm>
+          <a:off x="0" y="0"/>
+          <a:ext cx="0" cy="0"/>
+          <a:chOff x="0" y="0"/>
+          <a:chExt cx="0" cy="0"/>
+        </a:xfrm>
+      </p:grpSpPr>
+      <p:sp>
+        <p:nvSpPr>
+          <p:cNvPr id="2" name="Title 1">
+            <a:extLst>
+              <a:ext uri="{FF2B5EF4-FFF2-40B4-BE49-F238E27FC236}">
+                <a16:creationId xmlns:a16="http://schemas.microsoft.com/office/drawing/2014/main" id="{13861768-F87C-EA94-88B3-E5756E52150E}"/>
+              </a:ext>
+            </a:extLst>
+          </p:cNvPr>
+          <p:cNvSpPr>
+            <a:spLocks noGrp="1"/>
+          </p:cNvSpPr>
+          <p:nvPr>
+            <p:ph type="title"/>
+          </p:nvPr>
+        </p:nvSpPr>
+        <p:spPr/>
+        <p:txBody>
+          <a:bodyPr/>
+          <a:lstStyle/>
+          <a:p>
+            <a:r>
+              <a:rPr lang="en-US" dirty="0"/>
+              <a:t>Pending Actions</a:t>
+            </a:r>
+          </a:p>
+        </p:txBody>
+      </p:sp>
+      <p:sp>
+        <p:nvSpPr>
+          <p:cNvPr id="3" name="Content Placeholder 2">
+            <a:extLst>
+              <a:ext uri="{FF2B5EF4-FFF2-40B4-BE49-F238E27FC236}">
+                <a16:creationId xmlns:a16="http://schemas.microsoft.com/office/drawing/2014/main" id="{EC7203FF-B7D9-2C8A-1516-21C0CF8E5994}"/>
+              </a:ext>
+            </a:extLst>
+          </p:cNvPr>
+          <p:cNvSpPr>
+            <a:spLocks noGrp="1"/>
+          </p:cNvSpPr>
+          <p:nvPr>
+            <p:ph idx="1"/>
+          </p:nvPr>
+        </p:nvSpPr>
+        <p:spPr/>
+        <p:txBody>
+          <a:bodyPr/>
+          <a:lstStyle/>
+          <a:p>
+            <a:endParaRPr lang="en-US"/>
+          </a:p>
+        </p:txBody>
+      </p:sp>
+    </p:spTree>
+    <p:extLst>
+      <p:ext uri="{BB962C8B-B14F-4D97-AF65-F5344CB8AC3E}">
+        <p14:creationId xmlns:p14="http://schemas.microsoft.com/office/powerpoint/2010/main" val="3535608191"/>
+      </p:ext>
+    </p:extLst>
+  </p:cSld>
+  <p:clrMapOvr>
+    <a:masterClrMapping/>
+  </p:clrMapOvr>
+</p:sld>
+</file>
+
+<file path=ppt/slides/slide17.xml><?xml version="1.0" encoding="utf-8"?>
+<p:sld xmlns:a="http://schemas.openxmlformats.org/drawingml/2006/main" xmlns:r="http://schemas.openxmlformats.org/officeDocument/2006/relationships" xmlns:p="http://schemas.openxmlformats.org/presentationml/2006/main">
+  <p:cSld>
+    <p:spTree>
+      <p:nvGrpSpPr>
+        <p:cNvPr id="1" name=""/>
+        <p:cNvGrpSpPr/>
+        <p:nvPr/>
+      </p:nvGrpSpPr>
+      <p:grpSpPr>
+        <a:xfrm>
+          <a:off x="0" y="0"/>
+          <a:ext cx="0" cy="0"/>
+          <a:chOff x="0" y="0"/>
+          <a:chExt cx="0" cy="0"/>
+        </a:xfrm>
+      </p:grpSpPr>
+      <p:sp>
+        <p:nvSpPr>
+          <p:cNvPr id="2" name="Title 1">
+            <a:extLst>
+              <a:ext uri="{FF2B5EF4-FFF2-40B4-BE49-F238E27FC236}">
+                <a16:creationId xmlns:a16="http://schemas.microsoft.com/office/drawing/2014/main" id="{9B6A39C0-297C-157D-8C9E-19048A4AA3DC}"/>
+              </a:ext>
+            </a:extLst>
+          </p:cNvPr>
+          <p:cNvSpPr>
+            <a:spLocks noGrp="1"/>
+          </p:cNvSpPr>
+          <p:nvPr>
+            <p:ph type="title"/>
+          </p:nvPr>
+        </p:nvSpPr>
+        <p:spPr/>
+        <p:txBody>
+          <a:bodyPr/>
+          <a:lstStyle/>
+          <a:p>
+            <a:r>
+              <a:rPr lang="en-US" dirty="0"/>
+              <a:t>Next Steps</a:t>
+            </a:r>
+          </a:p>
+        </p:txBody>
+      </p:sp>
+      <p:sp>
+        <p:nvSpPr>
+          <p:cNvPr id="3" name="Content Placeholder 2">
+            <a:extLst>
+              <a:ext uri="{FF2B5EF4-FFF2-40B4-BE49-F238E27FC236}">
+                <a16:creationId xmlns:a16="http://schemas.microsoft.com/office/drawing/2014/main" id="{3F782B1F-A751-20C0-7174-45062BF3930F}"/>
+              </a:ext>
+            </a:extLst>
+          </p:cNvPr>
+          <p:cNvSpPr>
+            <a:spLocks noGrp="1"/>
+          </p:cNvSpPr>
+          <p:nvPr>
+            <p:ph idx="1"/>
+          </p:nvPr>
+        </p:nvSpPr>
+        <p:spPr/>
+        <p:txBody>
+          <a:bodyPr/>
+          <a:lstStyle/>
+          <a:p>
+            <a:endParaRPr lang="en-US"/>
+          </a:p>
+        </p:txBody>
+      </p:sp>
+    </p:spTree>
+    <p:extLst>
+      <p:ext uri="{BB962C8B-B14F-4D97-AF65-F5344CB8AC3E}">
+        <p14:creationId xmlns:p14="http://schemas.microsoft.com/office/powerpoint/2010/main" val="1799322483"/>
       </p:ext>
     </p:extLst>
   </p:cSld>

</xml_diff>

<commit_message>
added back testing files, made some documentation changes
</commit_message>
<xml_diff>
--- a/project_journal/standup/presentations/sprint4_standup.pptx
+++ b/project_journal/standup/presentations/sprint4_standup.pptx
@@ -1667,7 +1667,7 @@
           <a:p>
             <a:fld id="{C5760A9E-F5D7-4040-B515-3D966B4E754C}" type="datetimeFigureOut">
               <a:rPr lang="en-US" smtClean="0"/>
-              <a:t>6/12/2025</a:t>
+              <a:t>6/13/2025</a:t>
             </a:fld>
             <a:endParaRPr lang="en-US"/>
           </a:p>
@@ -1865,7 +1865,7 @@
           <a:p>
             <a:fld id="{C5760A9E-F5D7-4040-B515-3D966B4E754C}" type="datetimeFigureOut">
               <a:rPr lang="en-US" smtClean="0"/>
-              <a:t>6/12/2025</a:t>
+              <a:t>6/13/2025</a:t>
             </a:fld>
             <a:endParaRPr lang="en-US"/>
           </a:p>
@@ -2073,7 +2073,7 @@
           <a:p>
             <a:fld id="{C5760A9E-F5D7-4040-B515-3D966B4E754C}" type="datetimeFigureOut">
               <a:rPr lang="en-US" smtClean="0"/>
-              <a:t>6/12/2025</a:t>
+              <a:t>6/13/2025</a:t>
             </a:fld>
             <a:endParaRPr lang="en-US"/>
           </a:p>
@@ -2271,7 +2271,7 @@
           <a:p>
             <a:fld id="{C5760A9E-F5D7-4040-B515-3D966B4E754C}" type="datetimeFigureOut">
               <a:rPr lang="en-US" smtClean="0"/>
-              <a:t>6/12/2025</a:t>
+              <a:t>6/13/2025</a:t>
             </a:fld>
             <a:endParaRPr lang="en-US"/>
           </a:p>
@@ -2546,7 +2546,7 @@
           <a:p>
             <a:fld id="{C5760A9E-F5D7-4040-B515-3D966B4E754C}" type="datetimeFigureOut">
               <a:rPr lang="en-US" smtClean="0"/>
-              <a:t>6/12/2025</a:t>
+              <a:t>6/13/2025</a:t>
             </a:fld>
             <a:endParaRPr lang="en-US"/>
           </a:p>
@@ -2811,7 +2811,7 @@
           <a:p>
             <a:fld id="{C5760A9E-F5D7-4040-B515-3D966B4E754C}" type="datetimeFigureOut">
               <a:rPr lang="en-US" smtClean="0"/>
-              <a:t>6/12/2025</a:t>
+              <a:t>6/13/2025</a:t>
             </a:fld>
             <a:endParaRPr lang="en-US"/>
           </a:p>
@@ -3223,7 +3223,7 @@
           <a:p>
             <a:fld id="{C5760A9E-F5D7-4040-B515-3D966B4E754C}" type="datetimeFigureOut">
               <a:rPr lang="en-US" smtClean="0"/>
-              <a:t>6/12/2025</a:t>
+              <a:t>6/13/2025</a:t>
             </a:fld>
             <a:endParaRPr lang="en-US"/>
           </a:p>
@@ -3364,7 +3364,7 @@
           <a:p>
             <a:fld id="{C5760A9E-F5D7-4040-B515-3D966B4E754C}" type="datetimeFigureOut">
               <a:rPr lang="en-US" smtClean="0"/>
-              <a:t>6/12/2025</a:t>
+              <a:t>6/13/2025</a:t>
             </a:fld>
             <a:endParaRPr lang="en-US"/>
           </a:p>
@@ -3477,7 +3477,7 @@
           <a:p>
             <a:fld id="{C5760A9E-F5D7-4040-B515-3D966B4E754C}" type="datetimeFigureOut">
               <a:rPr lang="en-US" smtClean="0"/>
-              <a:t>6/12/2025</a:t>
+              <a:t>6/13/2025</a:t>
             </a:fld>
             <a:endParaRPr lang="en-US"/>
           </a:p>
@@ -3788,7 +3788,7 @@
           <a:p>
             <a:fld id="{C5760A9E-F5D7-4040-B515-3D966B4E754C}" type="datetimeFigureOut">
               <a:rPr lang="en-US" smtClean="0"/>
-              <a:t>6/12/2025</a:t>
+              <a:t>6/13/2025</a:t>
             </a:fld>
             <a:endParaRPr lang="en-US"/>
           </a:p>
@@ -4076,7 +4076,7 @@
           <a:p>
             <a:fld id="{C5760A9E-F5D7-4040-B515-3D966B4E754C}" type="datetimeFigureOut">
               <a:rPr lang="en-US" smtClean="0"/>
-              <a:t>6/12/2025</a:t>
+              <a:t>6/13/2025</a:t>
             </a:fld>
             <a:endParaRPr lang="en-US"/>
           </a:p>
@@ -4317,7 +4317,7 @@
           <a:p>
             <a:fld id="{C5760A9E-F5D7-4040-B515-3D966B4E754C}" type="datetimeFigureOut">
               <a:rPr lang="en-US" smtClean="0"/>
-              <a:t>6/12/2025</a:t>
+              <a:t>6/13/2025</a:t>
             </a:fld>
             <a:endParaRPr lang="en-US"/>
           </a:p>

</xml_diff>